<commit_message>
Finalize project submission: Add executive presentation, final pipeline, and update README
</commit_message>
<xml_diff>
--- a/docs/FreshCart_Executive_Presentation.pptx
+++ b/docs/FreshCart_Executive_Presentation.pptx
@@ -309,7 +309,7 @@
           <a:p>
             <a:fld id="{5BCAD085-E8A6-8845-BD4E-CB4CCA059FC4}" type="datetimeFigureOut">
               <a:rPr lang="en-US" smtClean="0"/>
-              <a:t>11/28/2025</a:t>
+              <a:t>11/29/2025</a:t>
             </a:fld>
             <a:endParaRPr lang="en-US"/>
           </a:p>
@@ -477,7 +477,7 @@
           <a:p>
             <a:fld id="{5BCAD085-E8A6-8845-BD4E-CB4CCA059FC4}" type="datetimeFigureOut">
               <a:rPr lang="en-US" smtClean="0"/>
-              <a:t>11/28/2025</a:t>
+              <a:t>11/29/2025</a:t>
             </a:fld>
             <a:endParaRPr lang="en-US"/>
           </a:p>
@@ -655,7 +655,7 @@
           <a:p>
             <a:fld id="{5BCAD085-E8A6-8845-BD4E-CB4CCA059FC4}" type="datetimeFigureOut">
               <a:rPr lang="en-US" smtClean="0"/>
-              <a:t>11/28/2025</a:t>
+              <a:t>11/29/2025</a:t>
             </a:fld>
             <a:endParaRPr lang="en-US"/>
           </a:p>
@@ -823,7 +823,7 @@
           <a:p>
             <a:fld id="{5BCAD085-E8A6-8845-BD4E-CB4CCA059FC4}" type="datetimeFigureOut">
               <a:rPr lang="en-US" smtClean="0"/>
-              <a:t>11/28/2025</a:t>
+              <a:t>11/29/2025</a:t>
             </a:fld>
             <a:endParaRPr lang="en-US"/>
           </a:p>
@@ -1068,7 +1068,7 @@
           <a:p>
             <a:fld id="{5BCAD085-E8A6-8845-BD4E-CB4CCA059FC4}" type="datetimeFigureOut">
               <a:rPr lang="en-US" smtClean="0"/>
-              <a:t>11/28/2025</a:t>
+              <a:t>11/29/2025</a:t>
             </a:fld>
             <a:endParaRPr lang="en-US"/>
           </a:p>
@@ -1353,7 +1353,7 @@
           <a:p>
             <a:fld id="{5BCAD085-E8A6-8845-BD4E-CB4CCA059FC4}" type="datetimeFigureOut">
               <a:rPr lang="en-US" smtClean="0"/>
-              <a:t>11/28/2025</a:t>
+              <a:t>11/29/2025</a:t>
             </a:fld>
             <a:endParaRPr lang="en-US"/>
           </a:p>
@@ -1772,7 +1772,7 @@
           <a:p>
             <a:fld id="{5BCAD085-E8A6-8845-BD4E-CB4CCA059FC4}" type="datetimeFigureOut">
               <a:rPr lang="en-US" smtClean="0"/>
-              <a:t>11/28/2025</a:t>
+              <a:t>11/29/2025</a:t>
             </a:fld>
             <a:endParaRPr lang="en-US"/>
           </a:p>
@@ -1889,7 +1889,7 @@
           <a:p>
             <a:fld id="{5BCAD085-E8A6-8845-BD4E-CB4CCA059FC4}" type="datetimeFigureOut">
               <a:rPr lang="en-US" smtClean="0"/>
-              <a:t>11/28/2025</a:t>
+              <a:t>11/29/2025</a:t>
             </a:fld>
             <a:endParaRPr lang="en-US"/>
           </a:p>
@@ -1984,7 +1984,7 @@
           <a:p>
             <a:fld id="{5BCAD085-E8A6-8845-BD4E-CB4CCA059FC4}" type="datetimeFigureOut">
               <a:rPr lang="en-US" smtClean="0"/>
-              <a:t>11/28/2025</a:t>
+              <a:t>11/29/2025</a:t>
             </a:fld>
             <a:endParaRPr lang="en-US"/>
           </a:p>
@@ -2259,7 +2259,7 @@
           <a:p>
             <a:fld id="{5BCAD085-E8A6-8845-BD4E-CB4CCA059FC4}" type="datetimeFigureOut">
               <a:rPr lang="en-US" smtClean="0"/>
-              <a:t>11/28/2025</a:t>
+              <a:t>11/29/2025</a:t>
             </a:fld>
             <a:endParaRPr lang="en-US"/>
           </a:p>
@@ -2511,7 +2511,7 @@
           <a:p>
             <a:fld id="{5BCAD085-E8A6-8845-BD4E-CB4CCA059FC4}" type="datetimeFigureOut">
               <a:rPr lang="en-US" smtClean="0"/>
-              <a:t>11/28/2025</a:t>
+              <a:t>11/29/2025</a:t>
             </a:fld>
             <a:endParaRPr lang="en-US"/>
           </a:p>
@@ -2722,7 +2722,7 @@
           <a:p>
             <a:fld id="{5BCAD085-E8A6-8845-BD4E-CB4CCA059FC4}" type="datetimeFigureOut">
               <a:rPr lang="en-US" smtClean="0"/>
-              <a:t>11/28/2025</a:t>
+              <a:t>11/29/2025</a:t>
             </a:fld>
             <a:endParaRPr lang="en-US"/>
           </a:p>
@@ -4004,7 +4004,23 @@
                   <a:srgbClr val="FFFFFF"/>
                 </a:solidFill>
               </a:rPr>
-              <a:t>Status: The project is technically complete, validated, and achieves a 92% AUC score.</a:t>
+              <a:t>Status: The project is technically complete, validated, and achieves a </a:t>
+            </a:r>
+            <a:r>
+              <a:rPr lang="en-US" sz="2200" dirty="0">
+                <a:solidFill>
+                  <a:srgbClr val="FFFFFF"/>
+                </a:solidFill>
+              </a:rPr>
+              <a:t>77</a:t>
+            </a:r>
+            <a:r>
+              <a:rPr sz="2200" dirty="0">
+                <a:solidFill>
+                  <a:srgbClr val="FFFFFF"/>
+                </a:solidFill>
+              </a:rPr>
+              <a:t>% AUC score.</a:t>
             </a:r>
           </a:p>
         </p:txBody>
@@ -4088,7 +4104,39 @@
                   <a:srgbClr val="FFFFFF"/>
                 </a:solidFill>
               </a:rPr>
-              <a:t>Predictive Power: The model successfully identifies 85 out of every 100 customers who are about to churn (85% Recall).</a:t>
+              <a:t>Predictive Power: The model successfully identifies 8</a:t>
+            </a:r>
+            <a:r>
+              <a:rPr lang="en-US" sz="2200" dirty="0">
+                <a:solidFill>
+                  <a:srgbClr val="FFFFFF"/>
+                </a:solidFill>
+              </a:rPr>
+              <a:t>1</a:t>
+            </a:r>
+            <a:r>
+              <a:rPr sz="2200" dirty="0">
+                <a:solidFill>
+                  <a:srgbClr val="FFFFFF"/>
+                </a:solidFill>
+              </a:rPr>
+              <a:t> out of every 100 customers who are about to churn (8</a:t>
+            </a:r>
+            <a:r>
+              <a:rPr lang="en-US" sz="2200" dirty="0">
+                <a:solidFill>
+                  <a:srgbClr val="FFFFFF"/>
+                </a:solidFill>
+              </a:rPr>
+              <a:t>1</a:t>
+            </a:r>
+            <a:r>
+              <a:rPr sz="2200" dirty="0">
+                <a:solidFill>
+                  <a:srgbClr val="FFFFFF"/>
+                </a:solidFill>
+              </a:rPr>
+              <a:t>% Recall).</a:t>
             </a:r>
           </a:p>
           <a:p>

</xml_diff>